<commit_message>
Small touches to slides before presentation
</commit_message>
<xml_diff>
--- a/profiling.pptx
+++ b/profiling.pptx
@@ -7370,7 +7370,7 @@
             <a:fld id="{80AC11AF-147E-0A48-A5B0-8DA858D84551}" type="datetimeFigureOut">
               <a:rPr lang="en-US" smtClean="0"/>
               <a:pPr/>
-              <a:t>8/24/18</a:t>
+              <a:t>9/1/18</a:t>
             </a:fld>
             <a:endParaRPr lang="en-US"/>
           </a:p>
@@ -9130,7 +9130,7 @@
           <a:p>
             <a:fld id="{385F5347-8FB3-ED4C-BA03-C57A0A4669E9}" type="datetime3">
               <a:rPr lang="en-US" smtClean="0"/>
-              <a:t>24 August 2018</a:t>
+              <a:t>1 September 2018</a:t>
             </a:fld>
             <a:endParaRPr lang="en-US"/>
           </a:p>
@@ -9298,7 +9298,7 @@
           <a:p>
             <a:fld id="{9ACA05F4-8663-8641-938C-34A3D0CE2413}" type="datetime3">
               <a:rPr lang="en-US" smtClean="0"/>
-              <a:t>24 August 2018</a:t>
+              <a:t>1 September 2018</a:t>
             </a:fld>
             <a:endParaRPr lang="en-US"/>
           </a:p>
@@ -9598,7 +9598,7 @@
           <a:p>
             <a:fld id="{27A094A4-5F84-2A42-877A-E2B1935FA535}" type="datetime3">
               <a:rPr lang="en-US" smtClean="0"/>
-              <a:t>24 August 2018</a:t>
+              <a:t>1 September 2018</a:t>
             </a:fld>
             <a:endParaRPr lang="en-US"/>
           </a:p>
@@ -9784,7 +9784,7 @@
           <a:p>
             <a:fld id="{2AAE131B-DC84-3347-B643-2B8F7525AD9B}" type="datetime3">
               <a:rPr lang="en-US" smtClean="0"/>
-              <a:t>24 August 2018</a:t>
+              <a:t>1 September 2018</a:t>
             </a:fld>
             <a:endParaRPr lang="en-US"/>
           </a:p>
@@ -10086,7 +10086,7 @@
           <a:p>
             <a:fld id="{FCC9F8EA-53CF-2145-A82F-DA50B25B5FEC}" type="datetime3">
               <a:rPr lang="en-US" smtClean="0"/>
-              <a:t>24 August 2018</a:t>
+              <a:t>1 September 2018</a:t>
             </a:fld>
             <a:endParaRPr lang="en-US"/>
           </a:p>
@@ -10321,7 +10321,7 @@
           <a:p>
             <a:fld id="{2C8989AB-72DB-8546-9669-2CAAF6BC3DC3}" type="datetime3">
               <a:rPr lang="en-US" smtClean="0"/>
-              <a:t>24 August 2018</a:t>
+              <a:t>1 September 2018</a:t>
             </a:fld>
             <a:endParaRPr lang="en-US"/>
           </a:p>
@@ -10676,7 +10676,7 @@
           <a:p>
             <a:fld id="{6E3FC465-804A-7E4B-993E-EC983464ADD1}" type="datetime3">
               <a:rPr lang="en-US" smtClean="0"/>
-              <a:t>24 August 2018</a:t>
+              <a:t>1 September 2018</a:t>
             </a:fld>
             <a:endParaRPr lang="en-US"/>
           </a:p>
@@ -10847,7 +10847,7 @@
           <a:p>
             <a:fld id="{191AE78A-AD1A-8246-A934-F993DF5F3A88}" type="datetime3">
               <a:rPr lang="en-US" smtClean="0"/>
-              <a:t>24 August 2018</a:t>
+              <a:t>1 September 2018</a:t>
             </a:fld>
             <a:endParaRPr lang="en-US"/>
           </a:p>
@@ -11027,7 +11027,7 @@
           <a:p>
             <a:fld id="{CC53E8C9-64C5-124A-8A36-AF4D7BE62FE7}" type="datetime3">
               <a:rPr lang="en-US" smtClean="0"/>
-              <a:t>24 August 2018</a:t>
+              <a:t>1 September 2018</a:t>
             </a:fld>
             <a:endParaRPr lang="en-US"/>
           </a:p>
@@ -11400,7 +11400,7 @@
           <a:p>
             <a:fld id="{1FA56CEB-BBF8-2647-A17A-98CD0D34208C}" type="datetime3">
               <a:rPr lang="en-US" smtClean="0"/>
-              <a:t>24 August 2018</a:t>
+              <a:t>1 September 2018</a:t>
             </a:fld>
             <a:endParaRPr lang="en-US"/>
           </a:p>
@@ -11631,7 +11631,7 @@
           <a:p>
             <a:fld id="{97AC98E6-9992-6041-A968-ED108F7A8284}" type="datetime3">
               <a:rPr lang="en-US" smtClean="0"/>
-              <a:t>24 August 2018</a:t>
+              <a:t>1 September 2018</a:t>
             </a:fld>
             <a:endParaRPr lang="en-US"/>
           </a:p>
@@ -11971,7 +11971,7 @@
           <a:p>
             <a:fld id="{97728646-3DE4-A644-8A2C-3A2A5C60793B}" type="datetime3">
               <a:rPr lang="en-US" smtClean="0"/>
-              <a:t>24 August 2018</a:t>
+              <a:t>1 September 2018</a:t>
             </a:fld>
             <a:endParaRPr lang="en-US"/>
           </a:p>
@@ -12531,15 +12531,25 @@
           <a:p>
             <a:r>
               <a:rPr lang="en-US" dirty="0"/>
-              <a:t>Optimization and profiling</a:t>
+              <a:t>Need for Speed</a:t>
             </a:r>
             <a:br>
               <a:rPr lang="en-US" dirty="0"/>
             </a:br>
+            <a:r>
+              <a:rPr lang="en-US" sz="2800" dirty="0">
+                <a:solidFill>
+                  <a:schemeClr val="bg1">
+                    <a:lumMod val="65000"/>
+                  </a:schemeClr>
+                </a:solidFill>
+              </a:rPr>
+              <a:t>Optimization and profiling</a:t>
+            </a:r>
             <a:endParaRPr lang="en-GB" dirty="0">
               <a:solidFill>
                 <a:schemeClr val="bg1">
-                  <a:lumMod val="50000"/>
+                  <a:lumMod val="65000"/>
                 </a:schemeClr>
               </a:solidFill>
             </a:endParaRPr>
@@ -12736,7 +12746,7 @@
           <a:p>
             <a:fld id="{AE87D922-CF79-D342-9411-7DD0DDB579BB}" type="datetime3">
               <a:rPr lang="en-US" smtClean="0"/>
-              <a:t>24 August 2018</a:t>
+              <a:t>1 September 2018</a:t>
             </a:fld>
             <a:endParaRPr lang="en-US"/>
           </a:p>
@@ -13028,7 +13038,7 @@
           <a:p>
             <a:fld id="{43055288-B156-C549-95B1-3889E02A2E4E}" type="datetime3">
               <a:rPr lang="en-US" smtClean="0"/>
-              <a:t>24 August 2018</a:t>
+              <a:t>1 September 2018</a:t>
             </a:fld>
             <a:endParaRPr lang="en-US"/>
           </a:p>
@@ -13248,7 +13258,21 @@
                 <a:latin typeface="Courier New" pitchFamily="49" charset="0"/>
                 <a:cs typeface="Courier New" pitchFamily="49" charset="0"/>
               </a:rPr>
-              <a:t> –s cumulative myscript.py</a:t>
+              <a:t> –s </a:t>
+            </a:r>
+            <a:r>
+              <a:rPr lang="en-GB" sz="2000" dirty="0" err="1">
+                <a:latin typeface="Courier New" pitchFamily="49" charset="0"/>
+                <a:cs typeface="Courier New" pitchFamily="49" charset="0"/>
+              </a:rPr>
+              <a:t>cumtime</a:t>
+            </a:r>
+            <a:r>
+              <a:rPr lang="en-GB" sz="2000" dirty="0">
+                <a:latin typeface="Courier New" pitchFamily="49" charset="0"/>
+                <a:cs typeface="Courier New" pitchFamily="49" charset="0"/>
+              </a:rPr>
+              <a:t> myscript.py</a:t>
             </a:r>
             <a:endParaRPr lang="en-GB" sz="2000" dirty="0"/>
           </a:p>
@@ -13342,7 +13366,7 @@
           <a:p>
             <a:fld id="{5EBAB421-1AE0-544D-973E-BEDE8EBA75AE}" type="datetime3">
               <a:rPr lang="en-US" smtClean="0"/>
-              <a:t>24 August 2018</a:t>
+              <a:t>1 September 2018</a:t>
             </a:fld>
             <a:endParaRPr lang="en-US"/>
           </a:p>
@@ -13676,7 +13700,7 @@
           <a:p>
             <a:fld id="{9477087B-A5FB-574D-92A0-69DF296797FA}" type="datetime3">
               <a:rPr lang="en-US" smtClean="0"/>
-              <a:t>24 August 2018</a:t>
+              <a:t>1 September 2018</a:t>
             </a:fld>
             <a:endParaRPr lang="en-US"/>
           </a:p>
@@ -13804,7 +13828,7 @@
           <a:p>
             <a:fld id="{8FD39C5B-896C-7D43-8016-FF23C4AD11F3}" type="datetime3">
               <a:rPr lang="en-US" smtClean="0"/>
-              <a:t>24 August 2018</a:t>
+              <a:t>1 September 2018</a:t>
             </a:fld>
             <a:endParaRPr lang="en-US"/>
           </a:p>
@@ -14010,14 +14034,14 @@
                 <a:latin typeface="Courier New"/>
                 <a:cs typeface="Courier New"/>
               </a:rPr>
-              <a:t> -o </a:t>
+              <a:t> -o factorial.prof3 </a:t>
             </a:r>
             <a:r>
               <a:rPr lang="en-US" sz="2000" dirty="0" err="1">
                 <a:latin typeface="Courier New"/>
                 <a:cs typeface="Courier New"/>
               </a:rPr>
-              <a:t>factorial.prof</a:t>
+              <a:t>factorial.py</a:t>
             </a:r>
             <a:r>
               <a:rPr lang="en-US" sz="2000" dirty="0">
@@ -14026,20 +14050,23 @@
               </a:rPr>
               <a:t> </a:t>
             </a:r>
-            <a:r>
-              <a:rPr lang="en-US" sz="2000" dirty="0" err="1">
-                <a:latin typeface="Courier New"/>
-                <a:cs typeface="Courier New"/>
+          </a:p>
+          <a:p>
+            <a:r>
+              <a:rPr lang="en-US" dirty="0"/>
+              <a:t>Convert Python3 profile format to Python2:</a:t>
+            </a:r>
+            <a:br>
+              <a:rPr lang="en-US" dirty="0"/>
+            </a:br>
+            <a:r>
+              <a:rPr lang="en-US" sz="2000" dirty="0">
+                <a:latin typeface="Courier New" panose="02070309020205020404" pitchFamily="49" charset="0"/>
+                <a:cs typeface="Courier New" panose="02070309020205020404" pitchFamily="49" charset="0"/>
               </a:rPr>
-              <a:t>factorial.py</a:t>
-            </a:r>
-            <a:r>
-              <a:rPr lang="en-US" sz="2000" dirty="0">
-                <a:latin typeface="Courier New"/>
-                <a:cs typeface="Courier New"/>
-              </a:rPr>
-              <a:t> </a:t>
-            </a:r>
+              <a:t>prof3to2 factorial.prof3 factorial.prof2</a:t>
+            </a:r>
+            <a:endParaRPr lang="en-US" sz="2000" dirty="0"/>
           </a:p>
           <a:p>
             <a:r>
@@ -14082,23 +14109,19 @@
               <a:t> </a:t>
             </a:r>
             <a:r>
-              <a:rPr lang="en-US" sz="2000" dirty="0" err="1">
+              <a:rPr lang="en-US" sz="2000" dirty="0">
                 <a:latin typeface="Courier New"/>
                 <a:cs typeface="Courier New"/>
               </a:rPr>
               <a:t>factorial</a:t>
             </a:r>
             <a:r>
-              <a:rPr lang="en-US" sz="2000" dirty="0" err="1">
+              <a:rPr lang="en-US" sz="2000" dirty="0">
                 <a:latin typeface="Courier New" panose="02070309020205020404" pitchFamily="49" charset="0"/>
                 <a:cs typeface="Courier New" panose="02070309020205020404" pitchFamily="49" charset="0"/>
               </a:rPr>
-              <a:t>.prof</a:t>
-            </a:r>
-            <a:endParaRPr lang="en-US" sz="2000" dirty="0">
-              <a:latin typeface="Courier New" panose="02070309020205020404" pitchFamily="49" charset="0"/>
-              <a:cs typeface="Courier New" panose="02070309020205020404" pitchFamily="49" charset="0"/>
-            </a:endParaRPr>
+              <a:t>.prof2</a:t>
+            </a:r>
           </a:p>
           <a:p>
             <a:pPr marL="0" indent="0">
@@ -14134,7 +14157,7 @@
           <a:p>
             <a:fld id="{42341848-F6EB-C74F-A8D6-CBBD13848CF2}" type="datetime3">
               <a:rPr lang="en-US" smtClean="0"/>
-              <a:t>24 August 2018</a:t>
+              <a:t>1 September 2018</a:t>
             </a:fld>
             <a:endParaRPr lang="en-US"/>
           </a:p>
@@ -14346,7 +14369,7 @@
           <a:p>
             <a:fld id="{A4F010E1-36E3-FB44-B652-7EC8E0792939}" type="datetime3">
               <a:rPr lang="en-US" smtClean="0"/>
-              <a:t>24 August 2018</a:t>
+              <a:t>1 September 2018</a:t>
             </a:fld>
             <a:endParaRPr lang="en-US"/>
           </a:p>
@@ -14564,7 +14587,7 @@
           <a:p>
             <a:fld id="{7A1860F8-1B81-684F-B51C-602552DFF6EC}" type="datetime3">
               <a:rPr lang="en-US" smtClean="0"/>
-              <a:t>24 August 2018</a:t>
+              <a:t>1 September 2018</a:t>
             </a:fld>
             <a:endParaRPr lang="en-US"/>
           </a:p>
@@ -14749,7 +14772,7 @@
           <a:p>
             <a:fld id="{01915FF6-898C-CD45-B47B-A398848BBBF4}" type="datetime3">
               <a:rPr lang="en-US" smtClean="0"/>
-              <a:t>24 August 2018</a:t>
+              <a:t>1 September 2018</a:t>
             </a:fld>
             <a:endParaRPr lang="en-US"/>
           </a:p>
@@ -14884,7 +14907,7 @@
           <a:p>
             <a:r>
               <a:rPr lang="en-GB" dirty="0"/>
-              <a:t>Optimizing without tests is irresponsible and punishable in some countries</a:t>
+              <a:t>Optimizing without tests is irresponsible and punishable in some labs</a:t>
             </a:r>
           </a:p>
           <a:p>
@@ -14912,7 +14935,7 @@
           <a:p>
             <a:fld id="{B26AE651-5F45-F144-8A5B-11988996C0FE}" type="datetime3">
               <a:rPr lang="en-US" smtClean="0"/>
-              <a:t>24 August 2018</a:t>
+              <a:t>1 September 2018</a:t>
             </a:fld>
             <a:endParaRPr lang="en-US"/>
           </a:p>
@@ -15307,7 +15330,7 @@
           <a:p>
             <a:fld id="{E361EB80-78D4-6A4A-976F-5A0B4182BF93}" type="datetime3">
               <a:rPr lang="en-US" smtClean="0"/>
-              <a:t>24 August 2018</a:t>
+              <a:t>1 September 2018</a:t>
             </a:fld>
             <a:endParaRPr lang="en-US"/>
           </a:p>
@@ -15407,7 +15430,7 @@
           <a:p>
             <a:fld id="{93D8C46C-6265-B94E-8F2B-475E306DFEAD}" type="datetime3">
               <a:rPr lang="en-US" smtClean="0"/>
-              <a:t>24 August 2018</a:t>
+              <a:t>1 September 2018</a:t>
             </a:fld>
             <a:endParaRPr lang="en-US"/>
           </a:p>
@@ -15566,7 +15589,7 @@
           <a:p>
             <a:fld id="{F24966B7-8108-C447-AA6D-A03462851C3F}" type="datetime3">
               <a:rPr lang="en-US" smtClean="0"/>
-              <a:t>24 August 2018</a:t>
+              <a:t>1 September 2018</a:t>
             </a:fld>
             <a:endParaRPr lang="en-US"/>
           </a:p>
@@ -15905,7 +15928,7 @@
           <a:p>
             <a:fld id="{D58449BB-632F-5A44-9D7B-214A298F2A8B}" type="datetime3">
               <a:rPr lang="en-US" smtClean="0"/>
-              <a:t>24 August 2018</a:t>
+              <a:t>1 September 2018</a:t>
             </a:fld>
             <a:endParaRPr lang="en-US"/>
           </a:p>
@@ -16151,7 +16174,7 @@
           <a:p>
             <a:r>
               <a:rPr lang="en-US" dirty="0"/>
-              <a:t>In many cases, scientist time, not computer time is the bottleneck</a:t>
+              <a:t>In many cases, researcher time, not computer time is the bottleneck</a:t>
             </a:r>
           </a:p>
           <a:p>
@@ -16223,7 +16246,7 @@
           <a:p>
             <a:fld id="{EB7A7E46-A1D9-514F-9216-F785A3B03EE6}" type="datetime3">
               <a:rPr lang="en-US" smtClean="0"/>
-              <a:t>24 August 2018</a:t>
+              <a:t>1 September 2018</a:t>
             </a:fld>
             <a:endParaRPr lang="en-US"/>
           </a:p>
@@ -16600,7 +16623,7 @@
           <a:p>
             <a:fld id="{6D750DC8-0C38-884B-B5DB-821F2B388C5C}" type="datetime3">
               <a:rPr lang="en-US" smtClean="0"/>
-              <a:t>24 August 2018</a:t>
+              <a:t>1 September 2018</a:t>
             </a:fld>
             <a:endParaRPr lang="en-US"/>
           </a:p>
@@ -16833,7 +16856,7 @@
           <a:p>
             <a:fld id="{16D42553-8134-694E-B259-1E40507E9FDE}" type="datetime3">
               <a:rPr lang="en-US" smtClean="0"/>
-              <a:t>24 August 2018</a:t>
+              <a:t>1 September 2018</a:t>
             </a:fld>
             <a:endParaRPr lang="en-US"/>
           </a:p>
@@ -16971,8 +16994,20 @@
           <a:lstStyle/>
           <a:p>
             <a:r>
+              <a:rPr lang="en-GB" dirty="0" err="1"/>
+              <a:t>Jupyter</a:t>
+            </a:r>
+            <a:r>
               <a:rPr lang="en-GB" dirty="0"/>
-              <a:t>IPython magic command: </a:t>
+              <a:t>/</a:t>
+            </a:r>
+            <a:r>
+              <a:rPr lang="en-GB" dirty="0" err="1"/>
+              <a:t>IPython</a:t>
+            </a:r>
+            <a:r>
+              <a:rPr lang="en-GB" dirty="0"/>
+              <a:t> magic command: </a:t>
             </a:r>
             <a:r>
               <a:rPr lang="en-GB" dirty="0">
@@ -17047,7 +17082,7 @@
           <a:p>
             <a:fld id="{5A81B0F4-7747-9145-A4AB-73B1BCE3355D}" type="datetime3">
               <a:rPr lang="en-US" smtClean="0"/>
-              <a:t>24 August 2018</a:t>
+              <a:t>1 September 2018</a:t>
             </a:fld>
             <a:endParaRPr lang="en-US"/>
           </a:p>
@@ -17239,13 +17274,16 @@
           <a:p>
             <a:r>
               <a:rPr lang="en-US" dirty="0"/>
-              <a:t>Time </a:t>
+              <a:t>Write a version using </a:t>
             </a:r>
             <a:r>
               <a:rPr lang="en-US" dirty="0" err="1"/>
               <a:t>numpy.dot</a:t>
             </a:r>
-            <a:endParaRPr lang="en-US" dirty="0"/>
+            <a:r>
+              <a:rPr lang="en-US" dirty="0"/>
+              <a:t>, time it again</a:t>
+            </a:r>
           </a:p>
           <a:p>
             <a:r>
@@ -17272,7 +17310,7 @@
           <a:p>
             <a:fld id="{8335CCD4-CF8D-1A48-B302-35A911DB186F}" type="datetime3">
               <a:rPr lang="en-US" smtClean="0"/>
-              <a:t>24 August 2018</a:t>
+              <a:t>1 September 2018</a:t>
             </a:fld>
             <a:endParaRPr lang="en-US"/>
           </a:p>

</xml_diff>